<commit_message>
Added test harness source
</commit_message>
<xml_diff>
--- a/CASE_simple_example/CASE Example.pptx
+++ b/CASE_simple_example/CASE Example.pptx
@@ -3711,11 +3711,7 @@
           <a:p>
             <a:r>
               <a:rPr lang="en-US" dirty="0" smtClean="0"/>
-              <a:t>In response to a status message from the Flight Controller, the Waypoint Manager sends the Flight Controller the current mission </a:t>
-            </a:r>
-            <a:r>
-              <a:rPr lang="en-US" dirty="0" smtClean="0"/>
-              <a:t>window (via the UART driver)</a:t>
+              <a:t>In response to a status message from the Flight Controller, the Waypoint Manager sends the Flight Controller the current mission window (via the UART driver)</a:t>
             </a:r>
           </a:p>
           <a:p>
@@ -3732,7 +3728,6 @@
               <a:rPr lang="en-US" dirty="0" smtClean="0"/>
               <a:t>waypoint N/2</a:t>
             </a:r>
-            <a:endParaRPr lang="en-US" dirty="0" smtClean="0"/>
           </a:p>
           <a:p>
             <a:r>
@@ -3741,25 +3736,8 @@
             </a:r>
             <a:r>
               <a:rPr lang="en-US" dirty="0" smtClean="0"/>
-              <a:t>he </a:t>
-            </a:r>
-            <a:r>
-              <a:rPr lang="en-US" dirty="0" smtClean="0"/>
-              <a:t>Waypoint Manager implementation already exists, and will be imported into the project as a </a:t>
-            </a:r>
-            <a:r>
-              <a:rPr lang="en-US" dirty="0" smtClean="0"/>
-              <a:t>legacy </a:t>
-            </a:r>
-            <a:r>
-              <a:rPr lang="en-US" dirty="0" smtClean="0"/>
-              <a:t>code </a:t>
-            </a:r>
-            <a:r>
-              <a:rPr lang="en-US" dirty="0" smtClean="0"/>
-              <a:t>component implemented in C</a:t>
-            </a:r>
-            <a:endParaRPr lang="en-US" dirty="0" smtClean="0"/>
+              <a:t>he Waypoint Manager implementation already exists, and will be imported into the project as a legacy code component implemented in C</a:t>
+            </a:r>
           </a:p>
         </p:txBody>
       </p:sp>
@@ -3846,11 +3824,7 @@
           <a:p>
             <a:r>
               <a:rPr lang="en-US" dirty="0" smtClean="0"/>
-              <a:t>The </a:t>
-            </a:r>
-            <a:r>
-              <a:rPr lang="en-US" dirty="0" smtClean="0"/>
-              <a:t>UART Driver aggregates all packets in a message received from the Flight Controller and combines them before passing to the Waypoint Manager, Flight Planner, and Ground Station (via the Radio driver)</a:t>
+              <a:t>The UART Driver aggregates all packets in a message received from the Flight Controller and combines them before passing to the Waypoint Manager, Flight Planner, and Ground Station (via the Radio driver)</a:t>
             </a:r>
             <a:endParaRPr lang="en-US" dirty="0"/>
           </a:p>
@@ -3946,13 +3920,8 @@
             <a:pPr lvl="1"/>
             <a:r>
               <a:rPr lang="en-US" dirty="0" smtClean="0"/>
-              <a:t>These messages include the current </a:t>
-            </a:r>
-            <a:r>
-              <a:rPr lang="en-US" dirty="0" smtClean="0"/>
-              <a:t>position and current waypoint ID</a:t>
-            </a:r>
-            <a:endParaRPr lang="en-US" dirty="0" smtClean="0"/>
+              <a:t>These messages include the current position and current waypoint ID</a:t>
+            </a:r>
           </a:p>
           <a:p>
             <a:r>
@@ -4050,54 +4019,26 @@
           <a:p>
             <a:r>
               <a:rPr lang="en-US" dirty="0" smtClean="0"/>
-              <a:t>The UAV shall </a:t>
-            </a:r>
-            <a:r>
-              <a:rPr lang="en-US" dirty="0" smtClean="0"/>
-              <a:t>continue to operate if communication with the Ground Station is lost after take-off</a:t>
-            </a:r>
-          </a:p>
-          <a:p>
-            <a:r>
-              <a:rPr lang="en-US" dirty="0" smtClean="0"/>
-              <a:t>If the Flight Planner fails after </a:t>
-            </a:r>
-            <a:r>
-              <a:rPr lang="en-US" dirty="0" smtClean="0"/>
-              <a:t>the initial</a:t>
-            </a:r>
-            <a:r>
-              <a:rPr lang="en-US" dirty="0" smtClean="0"/>
-              <a:t> mission has been generated, the UAV will complete that mission</a:t>
+              <a:t>The UAV shall continue to operate if communication with the Ground Station is lost after take-off</a:t>
+            </a:r>
+          </a:p>
+          <a:p>
+            <a:r>
+              <a:rPr lang="en-US" dirty="0" smtClean="0"/>
+              <a:t>If the Flight Planner fails after the initial mission has been generated, the UAV will complete that mission</a:t>
             </a:r>
           </a:p>
           <a:p>
             <a:pPr lvl="1"/>
             <a:r>
               <a:rPr lang="en-US" i="1" dirty="0" smtClean="0"/>
-              <a:t>Completing a mission means r</a:t>
-            </a:r>
-            <a:r>
-              <a:rPr lang="en-US" i="1" dirty="0" smtClean="0"/>
-              <a:t>eaching </a:t>
-            </a:r>
-            <a:r>
-              <a:rPr lang="en-US" i="1" dirty="0" smtClean="0"/>
-              <a:t>the last waypoint in the </a:t>
-            </a:r>
-            <a:r>
-              <a:rPr lang="en-US" i="1" dirty="0" smtClean="0"/>
-              <a:t>mission</a:t>
-            </a:r>
-          </a:p>
-          <a:p>
-            <a:r>
-              <a:rPr lang="en-US" dirty="0" smtClean="0"/>
-              <a:t>The </a:t>
-            </a:r>
-            <a:r>
-              <a:rPr lang="en-US" dirty="0" smtClean="0"/>
-              <a:t>UAV shall only accept commands from a legitimate Ground </a:t>
+              <a:t>Completing a mission means reaching the last waypoint in the mission</a:t>
+            </a:r>
+          </a:p>
+          <a:p>
+            <a:r>
+              <a:rPr lang="en-US" dirty="0" smtClean="0"/>
+              <a:t>The UAV shall only accept commands from a legitimate Ground </a:t>
             </a:r>
             <a:r>
               <a:rPr lang="en-US" dirty="0"/>
@@ -4117,11 +4058,7 @@
           <a:p>
             <a:r>
               <a:rPr lang="en-US" dirty="0" smtClean="0"/>
-              <a:t>The Ground Station shall only accept status messages from the </a:t>
-            </a:r>
-            <a:r>
-              <a:rPr lang="en-US" dirty="0" smtClean="0"/>
-              <a:t>UAV</a:t>
+              <a:t>The Ground Station shall only accept status messages from the UAV</a:t>
             </a:r>
           </a:p>
           <a:p>
@@ -4141,11 +4078,7 @@
             <a:pPr lvl="1"/>
             <a:r>
               <a:rPr lang="en-US" i="1" dirty="0" smtClean="0"/>
-              <a:t>Well-formed</a:t>
-            </a:r>
-            <a:r>
-              <a:rPr lang="en-US" i="1" dirty="0" smtClean="0"/>
-              <a:t>: contain only one cycle (the last element pointing to itself)</a:t>
+              <a:t>Well-formed: contain only one cycle (the last element pointing to itself)</a:t>
             </a:r>
           </a:p>
           <a:p>
@@ -4929,7 +4862,7 @@
       </p:sp>
       <p:pic>
         <p:nvPicPr>
-          <p:cNvPr id="4" name="Picture 3"/>
+          <p:cNvPr id="5" name="Picture 4"/>
           <p:cNvPicPr>
             <a:picLocks noChangeAspect="1"/>
           </p:cNvPicPr>
@@ -4943,8 +4876,8 @@
         </p:blipFill>
         <p:spPr>
           <a:xfrm>
-            <a:off x="1283369" y="1485046"/>
-            <a:ext cx="9384632" cy="5272708"/>
+            <a:off x="1567543" y="1434960"/>
+            <a:ext cx="9495039" cy="5357724"/>
           </a:xfrm>
           <a:prstGeom prst="rect">
             <a:avLst/>
@@ -5036,11 +4969,7 @@
           <a:p>
             <a:r>
               <a:rPr lang="en-US" dirty="0" smtClean="0"/>
-              <a:t>The </a:t>
-            </a:r>
-            <a:r>
-              <a:rPr lang="en-US" dirty="0" smtClean="0"/>
-              <a:t>UAV Mission Computer provides the UAV Flight Controller with a flight mission</a:t>
+              <a:t>The UAV Mission Computer provides the UAV Flight Controller with a flight mission</a:t>
             </a:r>
           </a:p>
           <a:p>
@@ -5176,25 +5105,13 @@
           <a:p>
             <a:r>
               <a:rPr lang="en-US" dirty="0" smtClean="0"/>
-              <a:t>The </a:t>
-            </a:r>
-            <a:r>
-              <a:rPr lang="en-US" dirty="0" smtClean="0"/>
-              <a:t>Ground Station </a:t>
-            </a:r>
-            <a:r>
-              <a:rPr lang="en-US" dirty="0" smtClean="0"/>
-              <a:t>must transmit a map and flight pattern before flight</a:t>
-            </a:r>
-          </a:p>
-          <a:p>
-            <a:r>
-              <a:rPr lang="en-US" dirty="0" smtClean="0"/>
-              <a:t>The </a:t>
-            </a:r>
-            <a:r>
-              <a:rPr lang="en-US" dirty="0" smtClean="0"/>
-              <a:t>Ground Station receives position updates from the UAV as it traverses the region</a:t>
+              <a:t>The Ground Station must transmit a map and flight pattern before flight</a:t>
+            </a:r>
+          </a:p>
+          <a:p>
+            <a:r>
+              <a:rPr lang="en-US" dirty="0" smtClean="0"/>
+              <a:t>The Ground Station receives position updates from the UAV as it traverses the region</a:t>
             </a:r>
           </a:p>
         </p:txBody>
@@ -5489,23 +5406,7 @@
             <a:pPr lvl="1"/>
             <a:r>
               <a:rPr lang="en-US" dirty="0" smtClean="0"/>
-              <a:t>The last </a:t>
-            </a:r>
-            <a:r>
-              <a:rPr lang="en-US" dirty="0" smtClean="0"/>
-              <a:t>waypoint element of the </a:t>
-            </a:r>
-            <a:r>
-              <a:rPr lang="en-US" dirty="0" smtClean="0"/>
-              <a:t>mission </a:t>
-            </a:r>
-            <a:r>
-              <a:rPr lang="en-US" dirty="0" smtClean="0"/>
-              <a:t>points </a:t>
-            </a:r>
-            <a:r>
-              <a:rPr lang="en-US" dirty="0" smtClean="0"/>
-              <a:t>to itself</a:t>
+              <a:t>The last waypoint element of the mission points to itself</a:t>
             </a:r>
           </a:p>
           <a:p>
@@ -5519,11 +5420,7 @@
             </a:r>
             <a:r>
               <a:rPr lang="en-US" dirty="0" smtClean="0"/>
-              <a:t>subset </a:t>
-            </a:r>
-            <a:r>
-              <a:rPr lang="en-US" dirty="0" smtClean="0"/>
-              <a:t>(window) </a:t>
+              <a:t>subset (window) </a:t>
             </a:r>
             <a:r>
               <a:rPr lang="en-US" dirty="0"/>
@@ -5554,19 +5451,7 @@
             </a:r>
             <a:r>
               <a:rPr lang="en-US" dirty="0" smtClean="0"/>
-              <a:t>mission waypoints </a:t>
-            </a:r>
-            <a:r>
-              <a:rPr lang="en-US" dirty="0" smtClean="0"/>
-              <a:t>based on the </a:t>
-            </a:r>
-            <a:r>
-              <a:rPr lang="en-US" dirty="0" smtClean="0"/>
-              <a:t>current </a:t>
-            </a:r>
-            <a:r>
-              <a:rPr lang="en-US" dirty="0" smtClean="0"/>
-              <a:t>position</a:t>
+              <a:t>mission waypoints based on the current position</a:t>
             </a:r>
           </a:p>
         </p:txBody>

</xml_diff>